<commit_message>
Add case four, organize files
</commit_message>
<xml_diff>
--- a/2/presentation.pptx
+++ b/2/presentation.pptx
@@ -420,7 +420,7 @@
     </p:spTree>
     <p:extLst>
       <p:ext uri="{BB962C8B-B14F-4D97-AF65-F5344CB8AC3E}">
-        <p14:creationId xmlns:p14="http://schemas.microsoft.com/office/powerpoint/2010/main" xmlns="" val="217279425"/>
+        <p14:creationId xmlns:p14="http://schemas.microsoft.com/office/powerpoint/2010/main" val="217279425"/>
       </p:ext>
     </p:extLst>
   </p:cSld>
@@ -19969,7 +19969,7 @@
         </p:nvSpPr>
         <p:spPr>
           <a:xfrm>
-            <a:off x="0" y="2819400"/>
+            <a:off x="311701" y="2819400"/>
             <a:ext cx="8520599" cy="841800"/>
           </a:xfrm>
           <a:prstGeom prst="rect">
@@ -20061,28 +20061,349 @@
       </p:grpSpPr>
       <p:grpSp>
         <p:nvGrpSpPr>
-          <p:cNvPr id="97" name="Shape 97"/>
+          <p:cNvPr id="2" name="Group 1"/>
           <p:cNvGrpSpPr/>
           <p:nvPr/>
         </p:nvGrpSpPr>
         <p:grpSpPr>
           <a:xfrm>
-            <a:off x="3416425" y="1956999"/>
-            <a:ext cx="2128799" cy="1245398"/>
-            <a:chOff x="3601100" y="2097175"/>
-            <a:chExt cx="2128799" cy="1245398"/>
+            <a:off x="311701" y="1956999"/>
+            <a:ext cx="8520599" cy="4520001"/>
+            <a:chOff x="228600" y="1956999"/>
+            <a:chExt cx="8520599" cy="4520001"/>
           </a:xfrm>
         </p:grpSpPr>
+        <p:grpSp>
+          <p:nvGrpSpPr>
+            <p:cNvPr id="97" name="Shape 97"/>
+            <p:cNvGrpSpPr/>
+            <p:nvPr/>
+          </p:nvGrpSpPr>
+          <p:grpSpPr>
+            <a:xfrm>
+              <a:off x="3416425" y="1956999"/>
+              <a:ext cx="2128799" cy="1245398"/>
+              <a:chOff x="3601100" y="2097175"/>
+              <a:chExt cx="2128799" cy="1245398"/>
+            </a:xfrm>
+          </p:grpSpPr>
+          <p:sp>
+            <p:nvSpPr>
+              <p:cNvPr id="98" name="Shape 98"/>
+              <p:cNvSpPr txBox="1"/>
+              <p:nvPr/>
+            </p:nvSpPr>
+            <p:spPr>
+              <a:xfrm>
+                <a:off x="3848450" y="2097175"/>
+                <a:ext cx="1634100" cy="911700"/>
+              </a:xfrm>
+              <a:prstGeom prst="rect">
+                <a:avLst/>
+              </a:prstGeom>
+              <a:noFill/>
+              <a:ln>
+                <a:noFill/>
+              </a:ln>
+            </p:spPr>
+            <p:txBody>
+              <a:bodyPr lIns="91425" tIns="91425" rIns="91425" bIns="91425" anchor="t" anchorCtr="0">
+                <a:noAutofit/>
+              </a:bodyPr>
+              <a:lstStyle/>
+              <a:p>
+                <a:pPr lvl="0" algn="ctr" rtl="0">
+                  <a:spcBef>
+                    <a:spcPts val="0"/>
+                  </a:spcBef>
+                  <a:buNone/>
+                </a:pPr>
+                <a:r>
+                  <a:rPr lang="en" sz="6000" dirty="0">
+                    <a:solidFill>
+                      <a:srgbClr val="E50E14"/>
+                    </a:solidFill>
+                    <a:latin typeface="Lato"/>
+                    <a:ea typeface="Lato"/>
+                    <a:cs typeface="Lato"/>
+                    <a:sym typeface="Lato"/>
+                  </a:rPr>
+                  <a:t>3.8k</a:t>
+                </a:r>
+              </a:p>
+            </p:txBody>
+          </p:sp>
+          <p:sp>
+            <p:nvSpPr>
+              <p:cNvPr id="99" name="Shape 99"/>
+              <p:cNvSpPr txBox="1"/>
+              <p:nvPr/>
+            </p:nvSpPr>
+            <p:spPr>
+              <a:xfrm>
+                <a:off x="3601100" y="2911473"/>
+                <a:ext cx="2128799" cy="431100"/>
+              </a:xfrm>
+              <a:prstGeom prst="rect">
+                <a:avLst/>
+              </a:prstGeom>
+              <a:noFill/>
+              <a:ln>
+                <a:noFill/>
+              </a:ln>
+            </p:spPr>
+            <p:txBody>
+              <a:bodyPr lIns="91425" tIns="91425" rIns="91425" bIns="91425" anchor="t" anchorCtr="0">
+                <a:noAutofit/>
+              </a:bodyPr>
+              <a:lstStyle/>
+              <a:p>
+                <a:pPr lvl="0" algn="ctr" rtl="0">
+                  <a:spcBef>
+                    <a:spcPts val="0"/>
+                  </a:spcBef>
+                  <a:buNone/>
+                </a:pPr>
+                <a:r>
+                  <a:rPr lang="en" sz="2400">
+                    <a:solidFill>
+                      <a:srgbClr val="666666"/>
+                    </a:solidFill>
+                    <a:latin typeface="Lato"/>
+                    <a:ea typeface="Lato"/>
+                    <a:cs typeface="Lato"/>
+                    <a:sym typeface="Lato"/>
+                  </a:rPr>
+                  <a:t>movies</a:t>
+                </a:r>
+              </a:p>
+            </p:txBody>
+          </p:sp>
+        </p:grpSp>
+        <p:grpSp>
+          <p:nvGrpSpPr>
+            <p:cNvPr id="100" name="Shape 100"/>
+            <p:cNvGrpSpPr/>
+            <p:nvPr/>
+          </p:nvGrpSpPr>
+          <p:grpSpPr>
+            <a:xfrm>
+              <a:off x="6287800" y="1956999"/>
+              <a:ext cx="2128799" cy="1245398"/>
+              <a:chOff x="3601100" y="2097175"/>
+              <a:chExt cx="2128799" cy="1245398"/>
+            </a:xfrm>
+          </p:grpSpPr>
+          <p:sp>
+            <p:nvSpPr>
+              <p:cNvPr id="101" name="Shape 101"/>
+              <p:cNvSpPr txBox="1"/>
+              <p:nvPr/>
+            </p:nvSpPr>
+            <p:spPr>
+              <a:xfrm>
+                <a:off x="3848450" y="2097175"/>
+                <a:ext cx="1634100" cy="911700"/>
+              </a:xfrm>
+              <a:prstGeom prst="rect">
+                <a:avLst/>
+              </a:prstGeom>
+              <a:noFill/>
+              <a:ln>
+                <a:noFill/>
+              </a:ln>
+            </p:spPr>
+            <p:txBody>
+              <a:bodyPr lIns="91425" tIns="91425" rIns="91425" bIns="91425" anchor="t" anchorCtr="0">
+                <a:noAutofit/>
+              </a:bodyPr>
+              <a:lstStyle/>
+              <a:p>
+                <a:pPr lvl="0" algn="ctr" rtl="0">
+                  <a:spcBef>
+                    <a:spcPts val="0"/>
+                  </a:spcBef>
+                  <a:buNone/>
+                </a:pPr>
+                <a:r>
+                  <a:rPr lang="en" sz="6000">
+                    <a:solidFill>
+                      <a:srgbClr val="E50E14"/>
+                    </a:solidFill>
+                    <a:latin typeface="Lato"/>
+                    <a:ea typeface="Lato"/>
+                    <a:cs typeface="Lato"/>
+                    <a:sym typeface="Lato"/>
+                  </a:rPr>
+                  <a:t>1m</a:t>
+                </a:r>
+              </a:p>
+            </p:txBody>
+          </p:sp>
+          <p:sp>
+            <p:nvSpPr>
+              <p:cNvPr id="102" name="Shape 102"/>
+              <p:cNvSpPr txBox="1"/>
+              <p:nvPr/>
+            </p:nvSpPr>
+            <p:spPr>
+              <a:xfrm>
+                <a:off x="3601100" y="2911473"/>
+                <a:ext cx="2128799" cy="431100"/>
+              </a:xfrm>
+              <a:prstGeom prst="rect">
+                <a:avLst/>
+              </a:prstGeom>
+              <a:noFill/>
+              <a:ln>
+                <a:noFill/>
+              </a:ln>
+            </p:spPr>
+            <p:txBody>
+              <a:bodyPr lIns="91425" tIns="91425" rIns="91425" bIns="91425" anchor="t" anchorCtr="0">
+                <a:noAutofit/>
+              </a:bodyPr>
+              <a:lstStyle/>
+              <a:p>
+                <a:pPr lvl="0" algn="ctr" rtl="0">
+                  <a:spcBef>
+                    <a:spcPts val="0"/>
+                  </a:spcBef>
+                  <a:buNone/>
+                </a:pPr>
+                <a:r>
+                  <a:rPr lang="en" sz="2400">
+                    <a:solidFill>
+                      <a:srgbClr val="666666"/>
+                    </a:solidFill>
+                    <a:latin typeface="Lato"/>
+                    <a:ea typeface="Lato"/>
+                    <a:cs typeface="Lato"/>
+                    <a:sym typeface="Lato"/>
+                  </a:rPr>
+                  <a:t>reviews</a:t>
+                </a:r>
+              </a:p>
+            </p:txBody>
+          </p:sp>
+        </p:grpSp>
+        <p:grpSp>
+          <p:nvGrpSpPr>
+            <p:cNvPr id="103" name="Shape 103"/>
+            <p:cNvGrpSpPr/>
+            <p:nvPr/>
+          </p:nvGrpSpPr>
+          <p:grpSpPr>
+            <a:xfrm>
+              <a:off x="727400" y="1956999"/>
+              <a:ext cx="2128799" cy="1245398"/>
+              <a:chOff x="3601100" y="2097175"/>
+              <a:chExt cx="2128799" cy="1245398"/>
+            </a:xfrm>
+          </p:grpSpPr>
+          <p:sp>
+            <p:nvSpPr>
+              <p:cNvPr id="104" name="Shape 104"/>
+              <p:cNvSpPr txBox="1"/>
+              <p:nvPr/>
+            </p:nvSpPr>
+            <p:spPr>
+              <a:xfrm>
+                <a:off x="3848450" y="2097175"/>
+                <a:ext cx="1634100" cy="911700"/>
+              </a:xfrm>
+              <a:prstGeom prst="rect">
+                <a:avLst/>
+              </a:prstGeom>
+              <a:noFill/>
+              <a:ln>
+                <a:noFill/>
+              </a:ln>
+            </p:spPr>
+            <p:txBody>
+              <a:bodyPr lIns="91425" tIns="91425" rIns="91425" bIns="91425" anchor="t" anchorCtr="0">
+                <a:noAutofit/>
+              </a:bodyPr>
+              <a:lstStyle/>
+              <a:p>
+                <a:pPr lvl="0" algn="ctr" rtl="0">
+                  <a:spcBef>
+                    <a:spcPts val="0"/>
+                  </a:spcBef>
+                  <a:buNone/>
+                </a:pPr>
+                <a:r>
+                  <a:rPr lang="en" sz="6000">
+                    <a:solidFill>
+                      <a:srgbClr val="E50E14"/>
+                    </a:solidFill>
+                    <a:latin typeface="Lato"/>
+                    <a:ea typeface="Lato"/>
+                    <a:cs typeface="Lato"/>
+                    <a:sym typeface="Lato"/>
+                  </a:rPr>
+                  <a:t>6k</a:t>
+                </a:r>
+              </a:p>
+            </p:txBody>
+          </p:sp>
+          <p:sp>
+            <p:nvSpPr>
+              <p:cNvPr id="105" name="Shape 105"/>
+              <p:cNvSpPr txBox="1"/>
+              <p:nvPr/>
+            </p:nvSpPr>
+            <p:spPr>
+              <a:xfrm>
+                <a:off x="3601100" y="2911473"/>
+                <a:ext cx="2128799" cy="431100"/>
+              </a:xfrm>
+              <a:prstGeom prst="rect">
+                <a:avLst/>
+              </a:prstGeom>
+              <a:noFill/>
+              <a:ln>
+                <a:noFill/>
+              </a:ln>
+            </p:spPr>
+            <p:txBody>
+              <a:bodyPr lIns="91425" tIns="91425" rIns="91425" bIns="91425" anchor="t" anchorCtr="0">
+                <a:noAutofit/>
+              </a:bodyPr>
+              <a:lstStyle/>
+              <a:p>
+                <a:pPr lvl="0" algn="ctr" rtl="0">
+                  <a:spcBef>
+                    <a:spcPts val="0"/>
+                  </a:spcBef>
+                  <a:buNone/>
+                </a:pPr>
+                <a:r>
+                  <a:rPr lang="en" sz="2400">
+                    <a:solidFill>
+                      <a:srgbClr val="666666"/>
+                    </a:solidFill>
+                    <a:latin typeface="Lato"/>
+                    <a:ea typeface="Lato"/>
+                    <a:cs typeface="Lato"/>
+                    <a:sym typeface="Lato"/>
+                  </a:rPr>
+                  <a:t>users</a:t>
+                </a:r>
+              </a:p>
+            </p:txBody>
+          </p:sp>
+        </p:grpSp>
         <p:sp>
           <p:nvSpPr>
-            <p:cNvPr id="98" name="Shape 98"/>
+            <p:cNvPr id="106" name="Shape 106"/>
             <p:cNvSpPr txBox="1"/>
             <p:nvPr/>
           </p:nvSpPr>
           <p:spPr>
             <a:xfrm>
-              <a:off x="3848450" y="2097175"/>
-              <a:ext cx="1634100" cy="911700"/>
+              <a:off x="727400" y="3304700"/>
+              <a:ext cx="2128799" cy="1596300"/>
             </a:xfrm>
             <a:prstGeom prst="rect">
               <a:avLst/>
@@ -20105,30 +20426,90 @@
                 <a:buNone/>
               </a:pPr>
               <a:r>
-                <a:rPr lang="en" sz="6000" dirty="0">
+                <a:rPr lang="en" sz="1800" dirty="0">
                   <a:solidFill>
-                    <a:srgbClr val="E50E14"/>
+                    <a:srgbClr val="B7B7B7"/>
                   </a:solidFill>
                   <a:latin typeface="Lato"/>
                   <a:ea typeface="Lato"/>
                   <a:cs typeface="Lato"/>
                   <a:sym typeface="Lato"/>
                 </a:rPr>
-                <a:t>3.8k</a:t>
+                <a:t>gender</a:t>
+              </a:r>
+            </a:p>
+            <a:p>
+              <a:pPr lvl="0" algn="ctr" rtl="0">
+                <a:spcBef>
+                  <a:spcPts val="0"/>
+                </a:spcBef>
+                <a:buNone/>
+              </a:pPr>
+              <a:r>
+                <a:rPr lang="en" sz="1800" dirty="0">
+                  <a:solidFill>
+                    <a:srgbClr val="B7B7B7"/>
+                  </a:solidFill>
+                  <a:latin typeface="Lato"/>
+                  <a:ea typeface="Lato"/>
+                  <a:cs typeface="Lato"/>
+                  <a:sym typeface="Lato"/>
+                </a:rPr>
+                <a:t>age</a:t>
+              </a:r>
+            </a:p>
+            <a:p>
+              <a:pPr lvl="0" algn="ctr" rtl="0">
+                <a:spcBef>
+                  <a:spcPts val="0"/>
+                </a:spcBef>
+                <a:buNone/>
+              </a:pPr>
+              <a:r>
+                <a:rPr lang="en" sz="1800" dirty="0">
+                  <a:solidFill>
+                    <a:srgbClr val="B7B7B7"/>
+                  </a:solidFill>
+                  <a:latin typeface="Lato"/>
+                  <a:ea typeface="Lato"/>
+                  <a:cs typeface="Lato"/>
+                  <a:sym typeface="Lato"/>
+                </a:rPr>
+                <a:t>occupation</a:t>
+              </a:r>
+            </a:p>
+            <a:p>
+              <a:pPr lvl="0" algn="ctr" rtl="0">
+                <a:spcBef>
+                  <a:spcPts val="0"/>
+                </a:spcBef>
+                <a:buNone/>
+              </a:pPr>
+              <a:r>
+                <a:rPr lang="en" sz="1800" dirty="0">
+                  <a:solidFill>
+                    <a:srgbClr val="B7B7B7"/>
+                  </a:solidFill>
+                  <a:latin typeface="Lato"/>
+                  <a:ea typeface="Lato"/>
+                  <a:cs typeface="Lato"/>
+                  <a:sym typeface="Lato"/>
+                </a:rPr>
+                <a:t>zip code</a:t>
               </a:r>
             </a:p>
           </p:txBody>
         </p:sp>
         <p:sp>
           <p:nvSpPr>
-            <p:cNvPr id="99" name="Shape 99"/>
+            <p:cNvPr id="107" name="Shape 107"/>
             <p:cNvSpPr txBox="1"/>
             <p:nvPr/>
           </p:nvSpPr>
           <p:spPr>
             <a:xfrm>
-              <a:off x="3601100" y="2911473"/>
-              <a:ext cx="2128799" cy="431100"/>
+              <a:off x="3416425" y="3304700"/>
+              <a:ext cx="2128799" cy="917100"/>
             </a:xfrm>
             <a:prstGeom prst="rect">
               <a:avLst/>
@@ -20151,45 +20532,50 @@
                 <a:buNone/>
               </a:pPr>
               <a:r>
-                <a:rPr lang="en" sz="2400">
+                <a:rPr lang="en" sz="1800">
                   <a:solidFill>
-                    <a:srgbClr val="666666"/>
+                    <a:srgbClr val="B7B7B7"/>
                   </a:solidFill>
                   <a:latin typeface="Lato"/>
                   <a:ea typeface="Lato"/>
                   <a:cs typeface="Lato"/>
                   <a:sym typeface="Lato"/>
                 </a:rPr>
-                <a:t>movies</a:t>
+                <a:t>title</a:t>
+              </a:r>
+            </a:p>
+            <a:p>
+              <a:pPr lvl="0" algn="ctr" rtl="0">
+                <a:spcBef>
+                  <a:spcPts val="0"/>
+                </a:spcBef>
+                <a:buNone/>
+              </a:pPr>
+              <a:r>
+                <a:rPr lang="en" sz="1800">
+                  <a:solidFill>
+                    <a:srgbClr val="B7B7B7"/>
+                  </a:solidFill>
+                  <a:latin typeface="Lato"/>
+                  <a:ea typeface="Lato"/>
+                  <a:cs typeface="Lato"/>
+                  <a:sym typeface="Lato"/>
+                </a:rPr>
+                <a:t>genre</a:t>
               </a:r>
             </a:p>
           </p:txBody>
         </p:sp>
-      </p:grpSp>
-      <p:grpSp>
-        <p:nvGrpSpPr>
-          <p:cNvPr id="100" name="Shape 100"/>
-          <p:cNvGrpSpPr/>
-          <p:nvPr/>
-        </p:nvGrpSpPr>
-        <p:grpSpPr>
-          <a:xfrm>
-            <a:off x="6287800" y="1956999"/>
-            <a:ext cx="2128799" cy="1245398"/>
-            <a:chOff x="3601100" y="2097175"/>
-            <a:chExt cx="2128799" cy="1245398"/>
-          </a:xfrm>
-        </p:grpSpPr>
         <p:sp>
           <p:nvSpPr>
-            <p:cNvPr id="101" name="Shape 101"/>
+            <p:cNvPr id="108" name="Shape 108"/>
             <p:cNvSpPr txBox="1"/>
             <p:nvPr/>
           </p:nvSpPr>
           <p:spPr>
             <a:xfrm>
-              <a:off x="3848450" y="2097175"/>
-              <a:ext cx="1634100" cy="911700"/>
+              <a:off x="6287800" y="3304700"/>
+              <a:ext cx="2128799" cy="1596300"/>
             </a:xfrm>
             <a:prstGeom prst="rect">
               <a:avLst/>
@@ -20212,30 +20598,90 @@
                 <a:buNone/>
               </a:pPr>
               <a:r>
-                <a:rPr lang="en" sz="6000">
+                <a:rPr lang="en" sz="1800">
                   <a:solidFill>
-                    <a:srgbClr val="E50E14"/>
+                    <a:srgbClr val="B7B7B7"/>
                   </a:solidFill>
                   <a:latin typeface="Lato"/>
                   <a:ea typeface="Lato"/>
                   <a:cs typeface="Lato"/>
                   <a:sym typeface="Lato"/>
                 </a:rPr>
-                <a:t>1m</a:t>
+                <a:t>movie</a:t>
+              </a:r>
+            </a:p>
+            <a:p>
+              <a:pPr lvl="0" algn="ctr" rtl="0">
+                <a:spcBef>
+                  <a:spcPts val="0"/>
+                </a:spcBef>
+                <a:buNone/>
+              </a:pPr>
+              <a:r>
+                <a:rPr lang="en" sz="1800">
+                  <a:solidFill>
+                    <a:srgbClr val="B7B7B7"/>
+                  </a:solidFill>
+                  <a:latin typeface="Lato"/>
+                  <a:ea typeface="Lato"/>
+                  <a:cs typeface="Lato"/>
+                  <a:sym typeface="Lato"/>
+                </a:rPr>
+                <a:t>user</a:t>
+              </a:r>
+            </a:p>
+            <a:p>
+              <a:pPr lvl="0" algn="ctr" rtl="0">
+                <a:spcBef>
+                  <a:spcPts val="0"/>
+                </a:spcBef>
+                <a:buNone/>
+              </a:pPr>
+              <a:r>
+                <a:rPr lang="en" sz="1800">
+                  <a:solidFill>
+                    <a:srgbClr val="B7B7B7"/>
+                  </a:solidFill>
+                  <a:latin typeface="Lato"/>
+                  <a:ea typeface="Lato"/>
+                  <a:cs typeface="Lato"/>
+                  <a:sym typeface="Lato"/>
+                </a:rPr>
+                <a:t>rating</a:t>
+              </a:r>
+            </a:p>
+            <a:p>
+              <a:pPr lvl="0" algn="ctr" rtl="0">
+                <a:spcBef>
+                  <a:spcPts val="0"/>
+                </a:spcBef>
+                <a:buNone/>
+              </a:pPr>
+              <a:r>
+                <a:rPr lang="en" sz="1800">
+                  <a:solidFill>
+                    <a:srgbClr val="B7B7B7"/>
+                  </a:solidFill>
+                  <a:latin typeface="Lato"/>
+                  <a:ea typeface="Lato"/>
+                  <a:cs typeface="Lato"/>
+                  <a:sym typeface="Lato"/>
+                </a:rPr>
+                <a:t>timestamp</a:t>
               </a:r>
             </a:p>
           </p:txBody>
         </p:sp>
         <p:sp>
           <p:nvSpPr>
-            <p:cNvPr id="102" name="Shape 102"/>
+            <p:cNvPr id="14" name="Shape 60"/>
             <p:cNvSpPr txBox="1"/>
             <p:nvPr/>
           </p:nvSpPr>
           <p:spPr>
             <a:xfrm>
-              <a:off x="3601100" y="2911473"/>
-              <a:ext cx="2128799" cy="431100"/>
+              <a:off x="228600" y="5638800"/>
+              <a:ext cx="8520599" cy="838200"/>
             </a:xfrm>
             <a:prstGeom prst="rect">
               <a:avLst/>
@@ -20246,7 +20692,7 @@
             </a:ln>
           </p:spPr>
           <p:txBody>
-            <a:bodyPr lIns="91425" tIns="91425" rIns="91425" bIns="91425" anchor="t" anchorCtr="0">
+            <a:bodyPr lIns="91425" tIns="91425" rIns="91425" bIns="91425" anchor="ctr" anchorCtr="0">
               <a:noAutofit/>
             </a:bodyPr>
             <a:lstStyle/>
@@ -20258,7 +20704,7 @@
                 <a:buNone/>
               </a:pPr>
               <a:r>
-                <a:rPr lang="en" sz="2400">
+                <a:rPr lang="en" sz="2000" i="1" dirty="0" smtClean="0">
                   <a:solidFill>
                     <a:srgbClr val="666666"/>
                   </a:solidFill>
@@ -20267,452 +20713,21 @@
                   <a:cs typeface="Lato"/>
                   <a:sym typeface="Lato"/>
                 </a:rPr>
-                <a:t>reviews</a:t>
+                <a:t>MovieLens 1M Ratings</a:t>
               </a:r>
+              <a:endParaRPr lang="en" sz="2000" i="1" dirty="0">
+                <a:solidFill>
+                  <a:srgbClr val="666666"/>
+                </a:solidFill>
+                <a:latin typeface="Lato"/>
+                <a:ea typeface="Lato"/>
+                <a:cs typeface="Lato"/>
+                <a:sym typeface="Lato"/>
+              </a:endParaRPr>
             </a:p>
           </p:txBody>
         </p:sp>
       </p:grpSp>
-      <p:grpSp>
-        <p:nvGrpSpPr>
-          <p:cNvPr id="103" name="Shape 103"/>
-          <p:cNvGrpSpPr/>
-          <p:nvPr/>
-        </p:nvGrpSpPr>
-        <p:grpSpPr>
-          <a:xfrm>
-            <a:off x="727400" y="1956999"/>
-            <a:ext cx="2128799" cy="1245398"/>
-            <a:chOff x="3601100" y="2097175"/>
-            <a:chExt cx="2128799" cy="1245398"/>
-          </a:xfrm>
-        </p:grpSpPr>
-        <p:sp>
-          <p:nvSpPr>
-            <p:cNvPr id="104" name="Shape 104"/>
-            <p:cNvSpPr txBox="1"/>
-            <p:nvPr/>
-          </p:nvSpPr>
-          <p:spPr>
-            <a:xfrm>
-              <a:off x="3848450" y="2097175"/>
-              <a:ext cx="1634100" cy="911700"/>
-            </a:xfrm>
-            <a:prstGeom prst="rect">
-              <a:avLst/>
-            </a:prstGeom>
-            <a:noFill/>
-            <a:ln>
-              <a:noFill/>
-            </a:ln>
-          </p:spPr>
-          <p:txBody>
-            <a:bodyPr lIns="91425" tIns="91425" rIns="91425" bIns="91425" anchor="t" anchorCtr="0">
-              <a:noAutofit/>
-            </a:bodyPr>
-            <a:lstStyle/>
-            <a:p>
-              <a:pPr lvl="0" algn="ctr" rtl="0">
-                <a:spcBef>
-                  <a:spcPts val="0"/>
-                </a:spcBef>
-                <a:buNone/>
-              </a:pPr>
-              <a:r>
-                <a:rPr lang="en" sz="6000">
-                  <a:solidFill>
-                    <a:srgbClr val="E50E14"/>
-                  </a:solidFill>
-                  <a:latin typeface="Lato"/>
-                  <a:ea typeface="Lato"/>
-                  <a:cs typeface="Lato"/>
-                  <a:sym typeface="Lato"/>
-                </a:rPr>
-                <a:t>6k</a:t>
-              </a:r>
-            </a:p>
-          </p:txBody>
-        </p:sp>
-        <p:sp>
-          <p:nvSpPr>
-            <p:cNvPr id="105" name="Shape 105"/>
-            <p:cNvSpPr txBox="1"/>
-            <p:nvPr/>
-          </p:nvSpPr>
-          <p:spPr>
-            <a:xfrm>
-              <a:off x="3601100" y="2911473"/>
-              <a:ext cx="2128799" cy="431100"/>
-            </a:xfrm>
-            <a:prstGeom prst="rect">
-              <a:avLst/>
-            </a:prstGeom>
-            <a:noFill/>
-            <a:ln>
-              <a:noFill/>
-            </a:ln>
-          </p:spPr>
-          <p:txBody>
-            <a:bodyPr lIns="91425" tIns="91425" rIns="91425" bIns="91425" anchor="t" anchorCtr="0">
-              <a:noAutofit/>
-            </a:bodyPr>
-            <a:lstStyle/>
-            <a:p>
-              <a:pPr lvl="0" algn="ctr" rtl="0">
-                <a:spcBef>
-                  <a:spcPts val="0"/>
-                </a:spcBef>
-                <a:buNone/>
-              </a:pPr>
-              <a:r>
-                <a:rPr lang="en" sz="2400">
-                  <a:solidFill>
-                    <a:srgbClr val="666666"/>
-                  </a:solidFill>
-                  <a:latin typeface="Lato"/>
-                  <a:ea typeface="Lato"/>
-                  <a:cs typeface="Lato"/>
-                  <a:sym typeface="Lato"/>
-                </a:rPr>
-                <a:t>users</a:t>
-              </a:r>
-            </a:p>
-          </p:txBody>
-        </p:sp>
-      </p:grpSp>
-      <p:sp>
-        <p:nvSpPr>
-          <p:cNvPr id="106" name="Shape 106"/>
-          <p:cNvSpPr txBox="1"/>
-          <p:nvPr/>
-        </p:nvSpPr>
-        <p:spPr>
-          <a:xfrm>
-            <a:off x="727400" y="3304700"/>
-            <a:ext cx="2128799" cy="1596300"/>
-          </a:xfrm>
-          <a:prstGeom prst="rect">
-            <a:avLst/>
-          </a:prstGeom>
-          <a:noFill/>
-          <a:ln>
-            <a:noFill/>
-          </a:ln>
-        </p:spPr>
-        <p:txBody>
-          <a:bodyPr lIns="91425" tIns="91425" rIns="91425" bIns="91425" anchor="t" anchorCtr="0">
-            <a:noAutofit/>
-          </a:bodyPr>
-          <a:lstStyle/>
-          <a:p>
-            <a:pPr lvl="0" algn="ctr" rtl="0">
-              <a:spcBef>
-                <a:spcPts val="0"/>
-              </a:spcBef>
-              <a:buNone/>
-            </a:pPr>
-            <a:r>
-              <a:rPr lang="en" sz="1800" dirty="0">
-                <a:solidFill>
-                  <a:srgbClr val="B7B7B7"/>
-                </a:solidFill>
-                <a:latin typeface="Lato"/>
-                <a:ea typeface="Lato"/>
-                <a:cs typeface="Lato"/>
-                <a:sym typeface="Lato"/>
-              </a:rPr>
-              <a:t>gender</a:t>
-            </a:r>
-          </a:p>
-          <a:p>
-            <a:pPr lvl="0" algn="ctr" rtl="0">
-              <a:spcBef>
-                <a:spcPts val="0"/>
-              </a:spcBef>
-              <a:buNone/>
-            </a:pPr>
-            <a:r>
-              <a:rPr lang="en" sz="1800" dirty="0">
-                <a:solidFill>
-                  <a:srgbClr val="B7B7B7"/>
-                </a:solidFill>
-                <a:latin typeface="Lato"/>
-                <a:ea typeface="Lato"/>
-                <a:cs typeface="Lato"/>
-                <a:sym typeface="Lato"/>
-              </a:rPr>
-              <a:t>age</a:t>
-            </a:r>
-          </a:p>
-          <a:p>
-            <a:pPr lvl="0" algn="ctr" rtl="0">
-              <a:spcBef>
-                <a:spcPts val="0"/>
-              </a:spcBef>
-              <a:buNone/>
-            </a:pPr>
-            <a:r>
-              <a:rPr lang="en" sz="1800" dirty="0">
-                <a:solidFill>
-                  <a:srgbClr val="B7B7B7"/>
-                </a:solidFill>
-                <a:latin typeface="Lato"/>
-                <a:ea typeface="Lato"/>
-                <a:cs typeface="Lato"/>
-                <a:sym typeface="Lato"/>
-              </a:rPr>
-              <a:t>occupation</a:t>
-            </a:r>
-          </a:p>
-          <a:p>
-            <a:pPr lvl="0" algn="ctr" rtl="0">
-              <a:spcBef>
-                <a:spcPts val="0"/>
-              </a:spcBef>
-              <a:buNone/>
-            </a:pPr>
-            <a:r>
-              <a:rPr lang="en" sz="1800" dirty="0">
-                <a:solidFill>
-                  <a:srgbClr val="B7B7B7"/>
-                </a:solidFill>
-                <a:latin typeface="Lato"/>
-                <a:ea typeface="Lato"/>
-                <a:cs typeface="Lato"/>
-                <a:sym typeface="Lato"/>
-              </a:rPr>
-              <a:t>zip code</a:t>
-            </a:r>
-          </a:p>
-        </p:txBody>
-      </p:sp>
-      <p:sp>
-        <p:nvSpPr>
-          <p:cNvPr id="107" name="Shape 107"/>
-          <p:cNvSpPr txBox="1"/>
-          <p:nvPr/>
-        </p:nvSpPr>
-        <p:spPr>
-          <a:xfrm>
-            <a:off x="3416425" y="3304700"/>
-            <a:ext cx="2128799" cy="917100"/>
-          </a:xfrm>
-          <a:prstGeom prst="rect">
-            <a:avLst/>
-          </a:prstGeom>
-          <a:noFill/>
-          <a:ln>
-            <a:noFill/>
-          </a:ln>
-        </p:spPr>
-        <p:txBody>
-          <a:bodyPr lIns="91425" tIns="91425" rIns="91425" bIns="91425" anchor="t" anchorCtr="0">
-            <a:noAutofit/>
-          </a:bodyPr>
-          <a:lstStyle/>
-          <a:p>
-            <a:pPr lvl="0" algn="ctr" rtl="0">
-              <a:spcBef>
-                <a:spcPts val="0"/>
-              </a:spcBef>
-              <a:buNone/>
-            </a:pPr>
-            <a:r>
-              <a:rPr lang="en" sz="1800">
-                <a:solidFill>
-                  <a:srgbClr val="B7B7B7"/>
-                </a:solidFill>
-                <a:latin typeface="Lato"/>
-                <a:ea typeface="Lato"/>
-                <a:cs typeface="Lato"/>
-                <a:sym typeface="Lato"/>
-              </a:rPr>
-              <a:t>title</a:t>
-            </a:r>
-          </a:p>
-          <a:p>
-            <a:pPr lvl="0" algn="ctr" rtl="0">
-              <a:spcBef>
-                <a:spcPts val="0"/>
-              </a:spcBef>
-              <a:buNone/>
-            </a:pPr>
-            <a:r>
-              <a:rPr lang="en" sz="1800">
-                <a:solidFill>
-                  <a:srgbClr val="B7B7B7"/>
-                </a:solidFill>
-                <a:latin typeface="Lato"/>
-                <a:ea typeface="Lato"/>
-                <a:cs typeface="Lato"/>
-                <a:sym typeface="Lato"/>
-              </a:rPr>
-              <a:t>genre</a:t>
-            </a:r>
-          </a:p>
-        </p:txBody>
-      </p:sp>
-      <p:sp>
-        <p:nvSpPr>
-          <p:cNvPr id="108" name="Shape 108"/>
-          <p:cNvSpPr txBox="1"/>
-          <p:nvPr/>
-        </p:nvSpPr>
-        <p:spPr>
-          <a:xfrm>
-            <a:off x="6287800" y="3304700"/>
-            <a:ext cx="2128799" cy="1596300"/>
-          </a:xfrm>
-          <a:prstGeom prst="rect">
-            <a:avLst/>
-          </a:prstGeom>
-          <a:noFill/>
-          <a:ln>
-            <a:noFill/>
-          </a:ln>
-        </p:spPr>
-        <p:txBody>
-          <a:bodyPr lIns="91425" tIns="91425" rIns="91425" bIns="91425" anchor="t" anchorCtr="0">
-            <a:noAutofit/>
-          </a:bodyPr>
-          <a:lstStyle/>
-          <a:p>
-            <a:pPr lvl="0" algn="ctr" rtl="0">
-              <a:spcBef>
-                <a:spcPts val="0"/>
-              </a:spcBef>
-              <a:buNone/>
-            </a:pPr>
-            <a:r>
-              <a:rPr lang="en" sz="1800">
-                <a:solidFill>
-                  <a:srgbClr val="B7B7B7"/>
-                </a:solidFill>
-                <a:latin typeface="Lato"/>
-                <a:ea typeface="Lato"/>
-                <a:cs typeface="Lato"/>
-                <a:sym typeface="Lato"/>
-              </a:rPr>
-              <a:t>movie</a:t>
-            </a:r>
-          </a:p>
-          <a:p>
-            <a:pPr lvl="0" algn="ctr" rtl="0">
-              <a:spcBef>
-                <a:spcPts val="0"/>
-              </a:spcBef>
-              <a:buNone/>
-            </a:pPr>
-            <a:r>
-              <a:rPr lang="en" sz="1800">
-                <a:solidFill>
-                  <a:srgbClr val="B7B7B7"/>
-                </a:solidFill>
-                <a:latin typeface="Lato"/>
-                <a:ea typeface="Lato"/>
-                <a:cs typeface="Lato"/>
-                <a:sym typeface="Lato"/>
-              </a:rPr>
-              <a:t>user</a:t>
-            </a:r>
-          </a:p>
-          <a:p>
-            <a:pPr lvl="0" algn="ctr" rtl="0">
-              <a:spcBef>
-                <a:spcPts val="0"/>
-              </a:spcBef>
-              <a:buNone/>
-            </a:pPr>
-            <a:r>
-              <a:rPr lang="en" sz="1800">
-                <a:solidFill>
-                  <a:srgbClr val="B7B7B7"/>
-                </a:solidFill>
-                <a:latin typeface="Lato"/>
-                <a:ea typeface="Lato"/>
-                <a:cs typeface="Lato"/>
-                <a:sym typeface="Lato"/>
-              </a:rPr>
-              <a:t>rating</a:t>
-            </a:r>
-          </a:p>
-          <a:p>
-            <a:pPr lvl="0" algn="ctr" rtl="0">
-              <a:spcBef>
-                <a:spcPts val="0"/>
-              </a:spcBef>
-              <a:buNone/>
-            </a:pPr>
-            <a:r>
-              <a:rPr lang="en" sz="1800">
-                <a:solidFill>
-                  <a:srgbClr val="B7B7B7"/>
-                </a:solidFill>
-                <a:latin typeface="Lato"/>
-                <a:ea typeface="Lato"/>
-                <a:cs typeface="Lato"/>
-                <a:sym typeface="Lato"/>
-              </a:rPr>
-              <a:t>timestamp</a:t>
-            </a:r>
-          </a:p>
-        </p:txBody>
-      </p:sp>
-      <p:sp>
-        <p:nvSpPr>
-          <p:cNvPr id="14" name="Shape 60"/>
-          <p:cNvSpPr txBox="1"/>
-          <p:nvPr/>
-        </p:nvSpPr>
-        <p:spPr>
-          <a:xfrm>
-            <a:off x="228600" y="5638800"/>
-            <a:ext cx="8520599" cy="838200"/>
-          </a:xfrm>
-          <a:prstGeom prst="rect">
-            <a:avLst/>
-          </a:prstGeom>
-          <a:noFill/>
-          <a:ln>
-            <a:noFill/>
-          </a:ln>
-        </p:spPr>
-        <p:txBody>
-          <a:bodyPr lIns="91425" tIns="91425" rIns="91425" bIns="91425" anchor="ctr" anchorCtr="0">
-            <a:noAutofit/>
-          </a:bodyPr>
-          <a:lstStyle/>
-          <a:p>
-            <a:pPr lvl="0" algn="ctr" rtl="0">
-              <a:spcBef>
-                <a:spcPts val="0"/>
-              </a:spcBef>
-              <a:buNone/>
-            </a:pPr>
-            <a:r>
-              <a:rPr lang="en" sz="2000" i="1" dirty="0" smtClean="0">
-                <a:solidFill>
-                  <a:srgbClr val="666666"/>
-                </a:solidFill>
-                <a:latin typeface="Lato"/>
-                <a:ea typeface="Lato"/>
-                <a:cs typeface="Lato"/>
-                <a:sym typeface="Lato"/>
-              </a:rPr>
-              <a:t>MovieLens 1M Ratings</a:t>
-            </a:r>
-            <a:endParaRPr lang="en" sz="2000" i="1" dirty="0">
-              <a:solidFill>
-                <a:srgbClr val="666666"/>
-              </a:solidFill>
-              <a:latin typeface="Lato"/>
-              <a:ea typeface="Lato"/>
-              <a:cs typeface="Lato"/>
-              <a:sym typeface="Lato"/>
-            </a:endParaRPr>
-          </a:p>
-        </p:txBody>
-      </p:sp>
     </p:spTree>
   </p:cSld>
   <p:clrMapOvr>

</xml_diff>